<commit_message>
Made the lines thicker. -Martin
</commit_message>
<xml_diff>
--- a/logo/logo.pptx
+++ b/logo/logo.pptx
@@ -3603,7 +3603,7 @@
               <a:gd name="adj2" fmla="val 9012139"/>
             </a:avLst>
           </a:prstGeom>
-          <a:ln w="25400">
+          <a:ln w="63500">
             <a:solidFill>
               <a:schemeClr val="tx1"/>
             </a:solidFill>
@@ -3655,7 +3655,7 @@
               <a:gd name="adj2" fmla="val 9012139"/>
             </a:avLst>
           </a:prstGeom>
-          <a:ln w="25400">
+          <a:ln w="63500">
             <a:solidFill>
               <a:schemeClr val="tx1"/>
             </a:solidFill>
@@ -3707,7 +3707,7 @@
               <a:gd name="adj2" fmla="val 9012139"/>
             </a:avLst>
           </a:prstGeom>
-          <a:ln w="25400">
+          <a:ln w="63500">
             <a:solidFill>
               <a:schemeClr val="tx1"/>
             </a:solidFill>
@@ -3759,7 +3759,7 @@
               <a:gd name="adj2" fmla="val 9012139"/>
             </a:avLst>
           </a:prstGeom>
-          <a:ln w="25400">
+          <a:ln w="63500">
             <a:solidFill>
               <a:schemeClr val="tx1"/>
             </a:solidFill>

</xml_diff>